<commit_message>
Add more info to the slides
</commit_message>
<xml_diff>
--- a/Contact Manager.pptx
+++ b/Contact Manager.pptx
@@ -10,10 +10,12 @@
     <p:sldId id="258" r:id="rId4"/>
     <p:sldId id="259" r:id="rId5"/>
     <p:sldId id="263" r:id="rId6"/>
-    <p:sldId id="266" r:id="rId7"/>
-    <p:sldId id="260" r:id="rId8"/>
-    <p:sldId id="264" r:id="rId9"/>
-    <p:sldId id="265" r:id="rId10"/>
+    <p:sldId id="268" r:id="rId7"/>
+    <p:sldId id="266" r:id="rId8"/>
+    <p:sldId id="260" r:id="rId9"/>
+    <p:sldId id="267" r:id="rId10"/>
+    <p:sldId id="264" r:id="rId11"/>
+    <p:sldId id="265" r:id="rId12"/>
   </p:sldIdLst>
   <p:sldSz cx="12192000" cy="6858000"/>
   <p:notesSz cx="6858000" cy="9144000"/>
@@ -112,6 +114,11 @@
       </a:defRPr>
     </a:lvl9pPr>
   </p:defaultTextStyle>
+  <p:extLst>
+    <p:ext uri="{EFAFB233-063F-42B5-8137-9DF3F51BA10A}">
+      <p15:sldGuideLst xmlns:p15="http://schemas.microsoft.com/office/powerpoint/2012/main"/>
+    </p:ext>
+  </p:extLst>
 </p:presentation>
 </file>
 
@@ -307,7 +314,7 @@
             <a:fld id="{B61BEF0D-F0BB-DE4B-95CE-6DB70DBA9567}" type="datetimeFigureOut">
               <a:rPr lang="en-US" dirty="0"/>
               <a:pPr/>
-              <a:t>9/18/2019</a:t>
+              <a:t>9/21/2019</a:t>
             </a:fld>
             <a:endParaRPr lang="en-US" dirty="0"/>
           </a:p>
@@ -740,7 +747,7 @@
             <a:fld id="{B61BEF0D-F0BB-DE4B-95CE-6DB70DBA9567}" type="datetimeFigureOut">
               <a:rPr lang="en-US" dirty="0"/>
               <a:pPr/>
-              <a:t>9/18/2019</a:t>
+              <a:t>9/21/2019</a:t>
             </a:fld>
             <a:endParaRPr lang="en-US" dirty="0"/>
           </a:p>
@@ -987,7 +994,7 @@
             <a:fld id="{B61BEF0D-F0BB-DE4B-95CE-6DB70DBA9567}" type="datetimeFigureOut">
               <a:rPr lang="en-US" dirty="0"/>
               <a:pPr/>
-              <a:t>9/18/2019</a:t>
+              <a:t>9/21/2019</a:t>
             </a:fld>
             <a:endParaRPr lang="en-US" dirty="0"/>
           </a:p>
@@ -1292,7 +1299,7 @@
             <a:fld id="{B61BEF0D-F0BB-DE4B-95CE-6DB70DBA9567}" type="datetimeFigureOut">
               <a:rPr lang="en-US" dirty="0"/>
               <a:pPr/>
-              <a:t>9/18/2019</a:t>
+              <a:t>9/21/2019</a:t>
             </a:fld>
             <a:endParaRPr lang="en-US" dirty="0"/>
           </a:p>
@@ -1607,7 +1614,7 @@
             <a:fld id="{B61BEF0D-F0BB-DE4B-95CE-6DB70DBA9567}" type="datetimeFigureOut">
               <a:rPr lang="en-US" dirty="0"/>
               <a:pPr/>
-              <a:t>9/18/2019</a:t>
+              <a:t>9/21/2019</a:t>
             </a:fld>
             <a:endParaRPr lang="en-US" dirty="0"/>
           </a:p>
@@ -1906,7 +1913,7 @@
             <a:fld id="{B61BEF0D-F0BB-DE4B-95CE-6DB70DBA9567}" type="datetimeFigureOut">
               <a:rPr lang="en-US" dirty="0"/>
               <a:pPr/>
-              <a:t>9/18/2019</a:t>
+              <a:t>9/21/2019</a:t>
             </a:fld>
             <a:endParaRPr lang="en-US" dirty="0"/>
           </a:p>
@@ -2270,7 +2277,7 @@
             <a:fld id="{B61BEF0D-F0BB-DE4B-95CE-6DB70DBA9567}" type="datetimeFigureOut">
               <a:rPr lang="en-US" dirty="0"/>
               <a:pPr/>
-              <a:t>9/18/2019</a:t>
+              <a:t>9/21/2019</a:t>
             </a:fld>
             <a:endParaRPr lang="en-US" dirty="0"/>
           </a:p>
@@ -2441,7 +2448,7 @@
             <a:fld id="{B61BEF0D-F0BB-DE4B-95CE-6DB70DBA9567}" type="datetimeFigureOut">
               <a:rPr lang="en-US" dirty="0"/>
               <a:pPr/>
-              <a:t>9/18/2019</a:t>
+              <a:t>9/21/2019</a:t>
             </a:fld>
             <a:endParaRPr lang="en-US" dirty="0"/>
           </a:p>
@@ -2618,7 +2625,7 @@
             <a:fld id="{B61BEF0D-F0BB-DE4B-95CE-6DB70DBA9567}" type="datetimeFigureOut">
               <a:rPr lang="en-US" dirty="0"/>
               <a:pPr/>
-              <a:t>9/18/2019</a:t>
+              <a:t>9/21/2019</a:t>
             </a:fld>
             <a:endParaRPr lang="en-US" dirty="0"/>
           </a:p>
@@ -2785,7 +2792,7 @@
             <a:fld id="{B61BEF0D-F0BB-DE4B-95CE-6DB70DBA9567}" type="datetimeFigureOut">
               <a:rPr lang="en-US" dirty="0"/>
               <a:pPr/>
-              <a:t>9/18/2019</a:t>
+              <a:t>9/21/2019</a:t>
             </a:fld>
             <a:endParaRPr lang="en-US" dirty="0"/>
           </a:p>
@@ -3032,7 +3039,7 @@
             <a:fld id="{B61BEF0D-F0BB-DE4B-95CE-6DB70DBA9567}" type="datetimeFigureOut">
               <a:rPr lang="en-US" dirty="0"/>
               <a:pPr/>
-              <a:t>9/18/2019</a:t>
+              <a:t>9/21/2019</a:t>
             </a:fld>
             <a:endParaRPr lang="en-US" dirty="0"/>
           </a:p>
@@ -3265,7 +3272,7 @@
             <a:fld id="{B61BEF0D-F0BB-DE4B-95CE-6DB70DBA9567}" type="datetimeFigureOut">
               <a:rPr lang="en-US" dirty="0"/>
               <a:pPr/>
-              <a:t>9/18/2019</a:t>
+              <a:t>9/21/2019</a:t>
             </a:fld>
             <a:endParaRPr lang="en-US" dirty="0"/>
           </a:p>
@@ -3644,7 +3651,7 @@
             <a:fld id="{B61BEF0D-F0BB-DE4B-95CE-6DB70DBA9567}" type="datetimeFigureOut">
               <a:rPr lang="en-US" dirty="0"/>
               <a:pPr/>
-              <a:t>9/18/2019</a:t>
+              <a:t>9/21/2019</a:t>
             </a:fld>
             <a:endParaRPr lang="en-US" dirty="0"/>
           </a:p>
@@ -3759,7 +3766,7 @@
             <a:fld id="{B61BEF0D-F0BB-DE4B-95CE-6DB70DBA9567}" type="datetimeFigureOut">
               <a:rPr lang="en-US" dirty="0"/>
               <a:pPr/>
-              <a:t>9/18/2019</a:t>
+              <a:t>9/21/2019</a:t>
             </a:fld>
             <a:endParaRPr lang="en-US" dirty="0"/>
           </a:p>
@@ -3851,7 +3858,7 @@
             <a:fld id="{B61BEF0D-F0BB-DE4B-95CE-6DB70DBA9567}" type="datetimeFigureOut">
               <a:rPr lang="en-US" dirty="0"/>
               <a:pPr/>
-              <a:t>9/18/2019</a:t>
+              <a:t>9/21/2019</a:t>
             </a:fld>
             <a:endParaRPr lang="en-US" dirty="0"/>
           </a:p>
@@ -4103,7 +4110,7 @@
             <a:fld id="{B61BEF0D-F0BB-DE4B-95CE-6DB70DBA9567}" type="datetimeFigureOut">
               <a:rPr lang="en-US" dirty="0"/>
               <a:pPr/>
-              <a:t>9/18/2019</a:t>
+              <a:t>9/21/2019</a:t>
             </a:fld>
             <a:endParaRPr lang="en-US" dirty="0"/>
           </a:p>
@@ -4383,7 +4390,7 @@
             <a:fld id="{B61BEF0D-F0BB-DE4B-95CE-6DB70DBA9567}" type="datetimeFigureOut">
               <a:rPr lang="en-US" dirty="0"/>
               <a:pPr/>
-              <a:t>9/18/2019</a:t>
+              <a:t>9/21/2019</a:t>
             </a:fld>
             <a:endParaRPr lang="en-US" dirty="0"/>
           </a:p>
@@ -4786,7 +4793,7 @@
             <a:fld id="{B61BEF0D-F0BB-DE4B-95CE-6DB70DBA9567}" type="datetimeFigureOut">
               <a:rPr lang="en-US" dirty="0"/>
               <a:pPr/>
-              <a:t>9/18/2019</a:t>
+              <a:t>9/21/2019</a:t>
             </a:fld>
             <a:endParaRPr lang="en-US" dirty="0"/>
           </a:p>
@@ -5388,6 +5395,173 @@
 </p:sld>
 </file>
 
+<file path=ppt/slides/slide10.xml><?xml version="1.0" encoding="utf-8"?>
+<p:sld xmlns:a="http://schemas.openxmlformats.org/drawingml/2006/main" xmlns:r="http://schemas.openxmlformats.org/officeDocument/2006/relationships" xmlns:p="http://schemas.openxmlformats.org/presentationml/2006/main">
+  <p:cSld>
+    <p:spTree>
+      <p:nvGrpSpPr>
+        <p:cNvPr id="1" name=""/>
+        <p:cNvGrpSpPr/>
+        <p:nvPr/>
+      </p:nvGrpSpPr>
+      <p:grpSpPr>
+        <a:xfrm>
+          <a:off x="0" y="0"/>
+          <a:ext cx="0" cy="0"/>
+          <a:chOff x="0" y="0"/>
+          <a:chExt cx="0" cy="0"/>
+        </a:xfrm>
+      </p:grpSpPr>
+      <p:sp>
+        <p:nvSpPr>
+          <p:cNvPr id="2" name="Title 1">
+            <a:extLst>
+              <a:ext uri="{FF2B5EF4-FFF2-40B4-BE49-F238E27FC236}">
+                <a16:creationId xmlns:a16="http://schemas.microsoft.com/office/drawing/2014/main" id="{A68C3BE9-0E8D-42A5-9F29-8C475B5651AD}"/>
+              </a:ext>
+            </a:extLst>
+          </p:cNvPr>
+          <p:cNvSpPr>
+            <a:spLocks noGrp="1"/>
+          </p:cNvSpPr>
+          <p:nvPr>
+            <p:ph type="title"/>
+          </p:nvPr>
+        </p:nvSpPr>
+        <p:spPr/>
+        <p:txBody>
+          <a:bodyPr/>
+          <a:lstStyle/>
+          <a:p>
+            <a:r>
+              <a:rPr lang="en-US" dirty="0" err="1"/>
+              <a:t>DEMo</a:t>
+            </a:r>
+            <a:endParaRPr lang="en-US" dirty="0"/>
+          </a:p>
+        </p:txBody>
+      </p:sp>
+      <p:sp>
+        <p:nvSpPr>
+          <p:cNvPr id="3" name="Content Placeholder 2">
+            <a:extLst>
+              <a:ext uri="{FF2B5EF4-FFF2-40B4-BE49-F238E27FC236}">
+                <a16:creationId xmlns:a16="http://schemas.microsoft.com/office/drawing/2014/main" id="{A099EACB-9982-4EBC-8D49-D209D562C806}"/>
+              </a:ext>
+            </a:extLst>
+          </p:cNvPr>
+          <p:cNvSpPr>
+            <a:spLocks noGrp="1"/>
+          </p:cNvSpPr>
+          <p:nvPr>
+            <p:ph idx="1"/>
+          </p:nvPr>
+        </p:nvSpPr>
+        <p:spPr/>
+        <p:txBody>
+          <a:bodyPr/>
+          <a:lstStyle/>
+          <a:p>
+            <a:endParaRPr lang="en-US"/>
+          </a:p>
+        </p:txBody>
+      </p:sp>
+    </p:spTree>
+    <p:extLst>
+      <p:ext uri="{BB962C8B-B14F-4D97-AF65-F5344CB8AC3E}">
+        <p14:creationId xmlns:p14="http://schemas.microsoft.com/office/powerpoint/2010/main" val="4253765089"/>
+      </p:ext>
+    </p:extLst>
+  </p:cSld>
+  <p:clrMapOvr>
+    <a:masterClrMapping/>
+  </p:clrMapOvr>
+</p:sld>
+</file>
+
+<file path=ppt/slides/slide11.xml><?xml version="1.0" encoding="utf-8"?>
+<p:sld xmlns:a="http://schemas.openxmlformats.org/drawingml/2006/main" xmlns:r="http://schemas.openxmlformats.org/officeDocument/2006/relationships" xmlns:p="http://schemas.openxmlformats.org/presentationml/2006/main">
+  <p:cSld>
+    <p:spTree>
+      <p:nvGrpSpPr>
+        <p:cNvPr id="1" name=""/>
+        <p:cNvGrpSpPr/>
+        <p:nvPr/>
+      </p:nvGrpSpPr>
+      <p:grpSpPr>
+        <a:xfrm>
+          <a:off x="0" y="0"/>
+          <a:ext cx="0" cy="0"/>
+          <a:chOff x="0" y="0"/>
+          <a:chExt cx="0" cy="0"/>
+        </a:xfrm>
+      </p:grpSpPr>
+      <p:sp>
+        <p:nvSpPr>
+          <p:cNvPr id="2" name="Title 1">
+            <a:extLst>
+              <a:ext uri="{FF2B5EF4-FFF2-40B4-BE49-F238E27FC236}">
+                <a16:creationId xmlns:a16="http://schemas.microsoft.com/office/drawing/2014/main" id="{CA4B430F-C2F6-4198-A902-18816E854A04}"/>
+              </a:ext>
+            </a:extLst>
+          </p:cNvPr>
+          <p:cNvSpPr>
+            <a:spLocks noGrp="1"/>
+          </p:cNvSpPr>
+          <p:nvPr>
+            <p:ph type="title"/>
+          </p:nvPr>
+        </p:nvSpPr>
+        <p:spPr/>
+        <p:txBody>
+          <a:bodyPr/>
+          <a:lstStyle/>
+          <a:p>
+            <a:r>
+              <a:rPr lang="en-US" dirty="0"/>
+              <a:t>Any Questions?</a:t>
+            </a:r>
+          </a:p>
+        </p:txBody>
+      </p:sp>
+      <p:sp>
+        <p:nvSpPr>
+          <p:cNvPr id="3" name="Content Placeholder 2">
+            <a:extLst>
+              <a:ext uri="{FF2B5EF4-FFF2-40B4-BE49-F238E27FC236}">
+                <a16:creationId xmlns:a16="http://schemas.microsoft.com/office/drawing/2014/main" id="{7FD4ED2B-9631-45B8-8634-EB480C2071B2}"/>
+              </a:ext>
+            </a:extLst>
+          </p:cNvPr>
+          <p:cNvSpPr>
+            <a:spLocks noGrp="1"/>
+          </p:cNvSpPr>
+          <p:nvPr>
+            <p:ph idx="1"/>
+          </p:nvPr>
+        </p:nvSpPr>
+        <p:spPr/>
+        <p:txBody>
+          <a:bodyPr/>
+          <a:lstStyle/>
+          <a:p>
+            <a:endParaRPr lang="en-US"/>
+          </a:p>
+        </p:txBody>
+      </p:sp>
+    </p:spTree>
+    <p:extLst>
+      <p:ext uri="{BB962C8B-B14F-4D97-AF65-F5344CB8AC3E}">
+        <p14:creationId xmlns:p14="http://schemas.microsoft.com/office/powerpoint/2010/main" val="4164652109"/>
+      </p:ext>
+    </p:extLst>
+  </p:cSld>
+  <p:clrMapOvr>
+    <a:masterClrMapping/>
+  </p:clrMapOvr>
+</p:sld>
+</file>
+
 <file path=ppt/slides/slide2.xml><?xml version="1.0" encoding="utf-8"?>
 <p:sld xmlns:a="http://schemas.openxmlformats.org/drawingml/2006/main" xmlns:r="http://schemas.openxmlformats.org/officeDocument/2006/relationships" xmlns:p="http://schemas.openxmlformats.org/presentationml/2006/main">
   <p:cSld>
@@ -5489,20 +5663,23 @@
               <a:rPr lang="en-US" dirty="0" err="1"/>
               <a:t>Fochezato</a:t>
             </a:r>
-            <a:endParaRPr lang="en-US" dirty="0"/>
+            <a:r>
+              <a:rPr lang="en-US" dirty="0"/>
+              <a:t> – Database</a:t>
+            </a:r>
           </a:p>
           <a:p>
             <a:pPr lvl="1"/>
             <a:r>
               <a:rPr lang="en-US" dirty="0"/>
-              <a:t>Blake Robertson</a:t>
+              <a:t>Blake Robertson - API</a:t>
             </a:r>
           </a:p>
           <a:p>
             <a:pPr lvl="1"/>
             <a:r>
               <a:rPr lang="en-US" dirty="0"/>
-              <a:t>Jacob Thomas</a:t>
+              <a:t>Jacob Thomas - API</a:t>
             </a:r>
           </a:p>
         </p:txBody>
@@ -5609,14 +5786,14 @@
             <a:pPr lvl="1"/>
             <a:r>
               <a:rPr lang="en-US" dirty="0"/>
-              <a:t>React.js (API)</a:t>
+              <a:t>HTML &amp; CSS (Front-End)</a:t>
             </a:r>
           </a:p>
           <a:p>
             <a:pPr lvl="1"/>
             <a:r>
               <a:rPr lang="en-US" dirty="0"/>
-              <a:t>Node.js (server)</a:t>
+              <a:t>Node.js (</a:t>
             </a:r>
           </a:p>
         </p:txBody>
@@ -5822,7 +5999,7 @@
           <p:cNvPr id="2" name="Title 1">
             <a:extLst>
               <a:ext uri="{FF2B5EF4-FFF2-40B4-BE49-F238E27FC236}">
-                <a16:creationId xmlns:a16="http://schemas.microsoft.com/office/drawing/2014/main" id="{78ADEFD2-63A9-442A-B7FB-0B44C19ECE8A}"/>
+                <a16:creationId xmlns:a16="http://schemas.microsoft.com/office/drawing/2014/main" id="{B3410EE8-2578-4700-AE68-9DF5D01E8A19}"/>
               </a:ext>
             </a:extLst>
           </p:cNvPr>
@@ -5840,7 +6017,7 @@
           <a:p>
             <a:r>
               <a:rPr lang="en-US" dirty="0"/>
-              <a:t>How did we do it?</a:t>
+              <a:t>Tools</a:t>
             </a:r>
           </a:p>
         </p:txBody>
@@ -5850,7 +6027,7 @@
           <p:cNvPr id="3" name="Content Placeholder 2">
             <a:extLst>
               <a:ext uri="{FF2B5EF4-FFF2-40B4-BE49-F238E27FC236}">
-                <a16:creationId xmlns:a16="http://schemas.microsoft.com/office/drawing/2014/main" id="{4C7AC2F1-AD90-46AA-B175-66DB9478E547}"/>
+                <a16:creationId xmlns:a16="http://schemas.microsoft.com/office/drawing/2014/main" id="{442E4FF5-14D1-4B3F-88C9-84E808D3EA6C}"/>
               </a:ext>
             </a:extLst>
           </p:cNvPr>
@@ -5866,14 +6043,39 @@
           <a:bodyPr/>
           <a:lstStyle/>
           <a:p>
-            <a:endParaRPr lang="en-US"/>
+            <a:r>
+              <a:rPr lang="en-US" dirty="0"/>
+              <a:t>POSTMAN – testing json requests</a:t>
+            </a:r>
+          </a:p>
+          <a:p>
+            <a:r>
+              <a:rPr lang="en-US" dirty="0" err="1"/>
+              <a:t>Jquery</a:t>
+            </a:r>
+            <a:endParaRPr lang="en-US" dirty="0"/>
+          </a:p>
+          <a:p>
+            <a:r>
+              <a:rPr lang="en-US" dirty="0"/>
+              <a:t>AWS - </a:t>
+            </a:r>
+          </a:p>
+          <a:p>
+            <a:endParaRPr lang="en-US" dirty="0"/>
+          </a:p>
+          <a:p>
+            <a:endParaRPr lang="en-US" dirty="0"/>
+          </a:p>
+          <a:p>
+            <a:endParaRPr lang="en-US" dirty="0"/>
           </a:p>
         </p:txBody>
       </p:sp>
     </p:spTree>
     <p:extLst>
       <p:ext uri="{BB962C8B-B14F-4D97-AF65-F5344CB8AC3E}">
-        <p14:creationId xmlns:p14="http://schemas.microsoft.com/office/powerpoint/2010/main" val="1614021118"/>
+        <p14:creationId xmlns:p14="http://schemas.microsoft.com/office/powerpoint/2010/main" val="1704742266"/>
       </p:ext>
     </p:extLst>
   </p:cSld>
@@ -5905,7 +6107,7 @@
           <p:cNvPr id="2" name="Title 1">
             <a:extLst>
               <a:ext uri="{FF2B5EF4-FFF2-40B4-BE49-F238E27FC236}">
-                <a16:creationId xmlns:a16="http://schemas.microsoft.com/office/drawing/2014/main" id="{445CFE1A-C390-4163-923E-B29DA2DFF17E}"/>
+                <a16:creationId xmlns:a16="http://schemas.microsoft.com/office/drawing/2014/main" id="{78ADEFD2-63A9-442A-B7FB-0B44C19ECE8A}"/>
               </a:ext>
             </a:extLst>
           </p:cNvPr>
@@ -5923,7 +6125,7 @@
           <a:p>
             <a:r>
               <a:rPr lang="en-US" dirty="0"/>
-              <a:t>What went well? What didn’t? Improvements for the future.</a:t>
+              <a:t>How did we do it?</a:t>
             </a:r>
           </a:p>
         </p:txBody>
@@ -5933,7 +6135,7 @@
           <p:cNvPr id="3" name="Content Placeholder 2">
             <a:extLst>
               <a:ext uri="{FF2B5EF4-FFF2-40B4-BE49-F238E27FC236}">
-                <a16:creationId xmlns:a16="http://schemas.microsoft.com/office/drawing/2014/main" id="{D002A43A-B8D8-40F5-8DC4-F5C42EFA24CE}"/>
+                <a16:creationId xmlns:a16="http://schemas.microsoft.com/office/drawing/2014/main" id="{4C7AC2F1-AD90-46AA-B175-66DB9478E547}"/>
               </a:ext>
             </a:extLst>
           </p:cNvPr>
@@ -5949,14 +6151,47 @@
           <a:bodyPr/>
           <a:lstStyle/>
           <a:p>
-            <a:endParaRPr lang="en-US"/>
+            <a:r>
+              <a:rPr lang="en-US" dirty="0"/>
+              <a:t>Begin with the models for the user and contact in the database and the HTML skeleton</a:t>
+            </a:r>
+          </a:p>
+          <a:p>
+            <a:r>
+              <a:rPr lang="en-US" dirty="0"/>
+              <a:t>Created basic routes for the website</a:t>
+            </a:r>
+          </a:p>
+          <a:p>
+            <a:r>
+              <a:rPr lang="en-US" dirty="0"/>
+              <a:t>Made basic json get and post request for the API</a:t>
+            </a:r>
+          </a:p>
+          <a:p>
+            <a:r>
+              <a:rPr lang="en-US" dirty="0"/>
+              <a:t>Testing the API with the database</a:t>
+            </a:r>
+          </a:p>
+          <a:p>
+            <a:r>
+              <a:rPr lang="en-US" dirty="0"/>
+              <a:t>Testing the API with the front-end</a:t>
+            </a:r>
+          </a:p>
+          <a:p>
+            <a:r>
+              <a:rPr lang="en-US" dirty="0"/>
+              <a:t>Merge it all together</a:t>
+            </a:r>
           </a:p>
         </p:txBody>
       </p:sp>
     </p:spTree>
     <p:extLst>
       <p:ext uri="{BB962C8B-B14F-4D97-AF65-F5344CB8AC3E}">
-        <p14:creationId xmlns:p14="http://schemas.microsoft.com/office/powerpoint/2010/main" val="3077989098"/>
+        <p14:creationId xmlns:p14="http://schemas.microsoft.com/office/powerpoint/2010/main" val="1614021118"/>
       </p:ext>
     </p:extLst>
   </p:cSld>
@@ -5988,7 +6223,7 @@
           <p:cNvPr id="2" name="Title 1">
             <a:extLst>
               <a:ext uri="{FF2B5EF4-FFF2-40B4-BE49-F238E27FC236}">
-                <a16:creationId xmlns:a16="http://schemas.microsoft.com/office/drawing/2014/main" id="{A68C3BE9-0E8D-42A5-9F29-8C475B5651AD}"/>
+                <a16:creationId xmlns:a16="http://schemas.microsoft.com/office/drawing/2014/main" id="{445CFE1A-C390-4163-923E-B29DA2DFF17E}"/>
               </a:ext>
             </a:extLst>
           </p:cNvPr>
@@ -6005,10 +6240,9 @@
           <a:lstStyle/>
           <a:p>
             <a:r>
-              <a:rPr lang="en-US" dirty="0" err="1"/>
-              <a:t>DEMo</a:t>
-            </a:r>
-            <a:endParaRPr lang="en-US" dirty="0"/>
+              <a:rPr lang="en-US" dirty="0"/>
+              <a:t>What went well? Improvements for the future.</a:t>
+            </a:r>
           </a:p>
         </p:txBody>
       </p:sp>
@@ -6017,7 +6251,7 @@
           <p:cNvPr id="3" name="Content Placeholder 2">
             <a:extLst>
               <a:ext uri="{FF2B5EF4-FFF2-40B4-BE49-F238E27FC236}">
-                <a16:creationId xmlns:a16="http://schemas.microsoft.com/office/drawing/2014/main" id="{A099EACB-9982-4EBC-8D49-D209D562C806}"/>
+                <a16:creationId xmlns:a16="http://schemas.microsoft.com/office/drawing/2014/main" id="{D002A43A-B8D8-40F5-8DC4-F5C42EFA24CE}"/>
               </a:ext>
             </a:extLst>
           </p:cNvPr>
@@ -6033,14 +6267,44 @@
           <a:bodyPr/>
           <a:lstStyle/>
           <a:p>
-            <a:endParaRPr lang="en-US"/>
+            <a:r>
+              <a:rPr lang="en-US" dirty="0"/>
+              <a:t>Setup communication very early </a:t>
+            </a:r>
+          </a:p>
+          <a:p>
+            <a:r>
+              <a:rPr lang="en-US" dirty="0"/>
+              <a:t>Had assigned roles</a:t>
+            </a:r>
+          </a:p>
+          <a:p>
+            <a:r>
+              <a:rPr lang="en-US" dirty="0"/>
+              <a:t>Semi-Daily Meetups</a:t>
+            </a:r>
+          </a:p>
+          <a:p>
+            <a:r>
+              <a:rPr lang="en-US" dirty="0"/>
+              <a:t>Working demo before presentation</a:t>
+            </a:r>
+          </a:p>
+          <a:p>
+            <a:r>
+              <a:rPr lang="en-US" dirty="0"/>
+              <a:t>Have md5 hash for passwords</a:t>
+            </a:r>
+          </a:p>
+          <a:p>
+            <a:endParaRPr lang="en-US" dirty="0"/>
           </a:p>
         </p:txBody>
       </p:sp>
     </p:spTree>
     <p:extLst>
       <p:ext uri="{BB962C8B-B14F-4D97-AF65-F5344CB8AC3E}">
-        <p14:creationId xmlns:p14="http://schemas.microsoft.com/office/powerpoint/2010/main" val="4253765089"/>
+        <p14:creationId xmlns:p14="http://schemas.microsoft.com/office/powerpoint/2010/main" val="3077989098"/>
       </p:ext>
     </p:extLst>
   </p:cSld>
@@ -6072,7 +6336,7 @@
           <p:cNvPr id="2" name="Title 1">
             <a:extLst>
               <a:ext uri="{FF2B5EF4-FFF2-40B4-BE49-F238E27FC236}">
-                <a16:creationId xmlns:a16="http://schemas.microsoft.com/office/drawing/2014/main" id="{CA4B430F-C2F6-4198-A902-18816E854A04}"/>
+                <a16:creationId xmlns:a16="http://schemas.microsoft.com/office/drawing/2014/main" id="{97D8AC07-B384-4D00-A4C9-40948F0BF611}"/>
               </a:ext>
             </a:extLst>
           </p:cNvPr>
@@ -6089,8 +6353,12 @@
           <a:lstStyle/>
           <a:p>
             <a:r>
-              <a:rPr lang="en-US" dirty="0"/>
-              <a:t>Any Questions?</a:t>
+              <a:rPr lang="en-US" dirty="0" err="1"/>
+              <a:t>WhaT</a:t>
+            </a:r>
+            <a:r>
+              <a:rPr lang="en-US" dirty="0"/>
+              <a:t> Went Wrong</a:t>
             </a:r>
           </a:p>
         </p:txBody>
@@ -6100,7 +6368,7 @@
           <p:cNvPr id="3" name="Content Placeholder 2">
             <a:extLst>
               <a:ext uri="{FF2B5EF4-FFF2-40B4-BE49-F238E27FC236}">
-                <a16:creationId xmlns:a16="http://schemas.microsoft.com/office/drawing/2014/main" id="{7FD4ED2B-9631-45B8-8634-EB480C2071B2}"/>
+                <a16:creationId xmlns:a16="http://schemas.microsoft.com/office/drawing/2014/main" id="{2D7588A9-006A-4488-B3D2-1857CC1F1F4A}"/>
               </a:ext>
             </a:extLst>
           </p:cNvPr>
@@ -6116,14 +6384,58 @@
           <a:bodyPr/>
           <a:lstStyle/>
           <a:p>
-            <a:endParaRPr lang="en-US"/>
+            <a:r>
+              <a:rPr lang="en-US" dirty="0"/>
+              <a:t>No members had any experience in web development</a:t>
+            </a:r>
+          </a:p>
+          <a:p>
+            <a:r>
+              <a:rPr lang="en-US" dirty="0"/>
+              <a:t>MERN stack difficult stack for beginners in web development</a:t>
+            </a:r>
+          </a:p>
+          <a:p>
+            <a:r>
+              <a:rPr lang="en-US" dirty="0"/>
+              <a:t>Should of spent less time on researching</a:t>
+            </a:r>
+          </a:p>
+          <a:p>
+            <a:r>
+              <a:rPr lang="en-US" dirty="0"/>
+              <a:t>No organized tasks</a:t>
+            </a:r>
+          </a:p>
+          <a:p>
+            <a:r>
+              <a:rPr lang="en-US" dirty="0"/>
+              <a:t>Difficulties with connecting API with database and front-end</a:t>
+            </a:r>
+          </a:p>
+          <a:p>
+            <a:r>
+              <a:rPr lang="en-US" dirty="0"/>
+              <a:t>Little to no experience with using </a:t>
+            </a:r>
+            <a:r>
+              <a:rPr lang="en-US" dirty="0" err="1"/>
+              <a:t>Github</a:t>
+            </a:r>
+            <a:r>
+              <a:rPr lang="en-US" dirty="0"/>
+              <a:t> for most members</a:t>
+            </a:r>
+          </a:p>
+          <a:p>
+            <a:endParaRPr lang="en-US" dirty="0"/>
           </a:p>
         </p:txBody>
       </p:sp>
     </p:spTree>
     <p:extLst>
       <p:ext uri="{BB962C8B-B14F-4D97-AF65-F5344CB8AC3E}">
-        <p14:creationId xmlns:p14="http://schemas.microsoft.com/office/powerpoint/2010/main" val="4164652109"/>
+        <p14:creationId xmlns:p14="http://schemas.microsoft.com/office/powerpoint/2010/main" val="3696105661"/>
       </p:ext>
     </p:extLst>
   </p:cSld>

</xml_diff>

<commit_message>
Fixed URL links again
</commit_message>
<xml_diff>
--- a/Contact Manager.pptx
+++ b/Contact Manager.pptx
@@ -5468,10 +5468,8 @@
             </a:r>
             <a:r>
               <a:rPr lang="en-US" dirty="0"/>
-              <a:t> link:</a:t>
-            </a:r>
-          </a:p>
-          <a:p>
+              <a:t> Link: </a:t>
+            </a:r>
             <a:r>
               <a:rPr lang="en-US" dirty="0">
                 <a:hlinkClick r:id="rId2"/>
@@ -5482,16 +5480,11 @@
           </a:p>
           <a:p>
             <a:r>
-              <a:rPr lang="en-US" dirty="0"/>
-              <a:t>Website link:</a:t>
-            </a:r>
-          </a:p>
-          <a:p>
-            <a:pPr marL="0" indent="0">
-              <a:buNone/>
-            </a:pPr>
-            <a:r>
-              <a:rPr lang="en-US" dirty="0">
+              <a:rPr lang="en-US"/>
+              <a:t>Website Link: </a:t>
+            </a:r>
+            <a:r>
+              <a:rPr lang="en-US">
                 <a:hlinkClick r:id="rId3"/>
               </a:rPr>
               <a:t>http://ec2-18-221-247-1.us-east-2.compute.amazonaws.com:3000/</a:t>
@@ -5827,7 +5820,7 @@
             <a:pPr lvl="1"/>
             <a:r>
               <a:rPr lang="en-US" dirty="0"/>
-              <a:t>Node.js (Web Framework)</a:t>
+              <a:t>Node.js (</a:t>
             </a:r>
           </a:p>
         </p:txBody>

</xml_diff>